<commit_message>
Incorrect name in presentation!
</commit_message>
<xml_diff>
--- a/presentation.pptx
+++ b/presentation.pptx
@@ -207,7 +207,8 @@
           <a:p>
             <a:fld id="{FC4C7484-A978-4228-928A-7BEE3E9B3761}" type="datetimeFigureOut">
               <a:rPr lang="ru-RU" smtClean="0"/>
-              <a:t>12.11.2019</a:t>
+              <a:pPr/>
+              <a:t>13.11.2019</a:t>
             </a:fld>
             <a:endParaRPr lang="ru-RU"/>
           </a:p>
@@ -368,6 +369,7 @@
           <a:p>
             <a:fld id="{57F70759-3B09-4FE5-98F8-68BBA2508F41}" type="slidenum">
               <a:rPr lang="ru-RU" smtClean="0"/>
+              <a:pPr/>
               <a:t>‹#›</a:t>
             </a:fld>
             <a:endParaRPr lang="ru-RU"/>
@@ -544,6 +546,7 @@
           <a:p>
             <a:fld id="{57F70759-3B09-4FE5-98F8-68BBA2508F41}" type="slidenum">
               <a:rPr lang="ru-RU" smtClean="0"/>
+              <a:pPr/>
               <a:t>2</a:t>
             </a:fld>
             <a:endParaRPr lang="ru-RU"/>
@@ -739,7 +742,8 @@
           <a:p>
             <a:fld id="{1C48ADC7-6284-4563-A53C-8C801AB1E89B}" type="datetime1">
               <a:rPr lang="ru-RU" smtClean="0"/>
-              <a:t>12.11.2019</a:t>
+              <a:pPr/>
+              <a:t>13.11.2019</a:t>
             </a:fld>
             <a:endParaRPr lang="ru-RU"/>
           </a:p>
@@ -781,6 +785,7 @@
           <a:p>
             <a:fld id="{CF8BA92F-384F-4CC9-95B3-CAC823A31A13}" type="slidenum">
               <a:rPr lang="ru-RU" smtClean="0"/>
+              <a:pPr/>
               <a:t>‹#›</a:t>
             </a:fld>
             <a:endParaRPr lang="ru-RU"/>
@@ -904,7 +909,8 @@
           <a:p>
             <a:fld id="{7DC3E7C5-BD2E-4374-9AE9-6F406573A3F6}" type="datetime1">
               <a:rPr lang="ru-RU" smtClean="0"/>
-              <a:t>12.11.2019</a:t>
+              <a:pPr/>
+              <a:t>13.11.2019</a:t>
             </a:fld>
             <a:endParaRPr lang="ru-RU"/>
           </a:p>
@@ -946,6 +952,7 @@
           <a:p>
             <a:fld id="{CF8BA92F-384F-4CC9-95B3-CAC823A31A13}" type="slidenum">
               <a:rPr lang="ru-RU" smtClean="0"/>
+              <a:pPr/>
               <a:t>‹#›</a:t>
             </a:fld>
             <a:endParaRPr lang="ru-RU"/>
@@ -1079,7 +1086,8 @@
           <a:p>
             <a:fld id="{E8BE84D2-797E-4840-9869-3727362FABF0}" type="datetime1">
               <a:rPr lang="ru-RU" smtClean="0"/>
-              <a:t>12.11.2019</a:t>
+              <a:pPr/>
+              <a:t>13.11.2019</a:t>
             </a:fld>
             <a:endParaRPr lang="ru-RU"/>
           </a:p>
@@ -1121,6 +1129,7 @@
           <a:p>
             <a:fld id="{CF8BA92F-384F-4CC9-95B3-CAC823A31A13}" type="slidenum">
               <a:rPr lang="ru-RU" smtClean="0"/>
+              <a:pPr/>
               <a:t>‹#›</a:t>
             </a:fld>
             <a:endParaRPr lang="ru-RU"/>
@@ -1244,7 +1253,8 @@
           <a:p>
             <a:fld id="{2DA0F686-D3B8-4DB8-86AF-2412A36A9BCA}" type="datetime1">
               <a:rPr lang="ru-RU" smtClean="0"/>
-              <a:t>12.11.2019</a:t>
+              <a:pPr/>
+              <a:t>13.11.2019</a:t>
             </a:fld>
             <a:endParaRPr lang="ru-RU"/>
           </a:p>
@@ -1495,7 +1505,8 @@
           <a:p>
             <a:fld id="{685FBB0C-073D-42FE-9C0C-D44F87DD1C8C}" type="datetime1">
               <a:rPr lang="ru-RU" smtClean="0"/>
-              <a:t>12.11.2019</a:t>
+              <a:pPr/>
+              <a:t>13.11.2019</a:t>
             </a:fld>
             <a:endParaRPr lang="ru-RU"/>
           </a:p>
@@ -1537,6 +1548,7 @@
           <a:p>
             <a:fld id="{CF8BA92F-384F-4CC9-95B3-CAC823A31A13}" type="slidenum">
               <a:rPr lang="ru-RU" smtClean="0"/>
+              <a:pPr/>
               <a:t>‹#›</a:t>
             </a:fld>
             <a:endParaRPr lang="ru-RU"/>
@@ -1778,7 +1790,8 @@
           <a:p>
             <a:fld id="{6D5C234A-9CA2-4B5E-A067-2EAA5819AEB0}" type="datetime1">
               <a:rPr lang="ru-RU" smtClean="0"/>
-              <a:t>12.11.2019</a:t>
+              <a:pPr/>
+              <a:t>13.11.2019</a:t>
             </a:fld>
             <a:endParaRPr lang="ru-RU"/>
           </a:p>
@@ -1820,6 +1833,7 @@
           <a:p>
             <a:fld id="{CF8BA92F-384F-4CC9-95B3-CAC823A31A13}" type="slidenum">
               <a:rPr lang="ru-RU" smtClean="0"/>
+              <a:pPr/>
               <a:t>‹#›</a:t>
             </a:fld>
             <a:endParaRPr lang="ru-RU"/>
@@ -2195,7 +2209,8 @@
           <a:p>
             <a:fld id="{AF592190-F8CA-42E7-B736-BAD7F3246283}" type="datetime1">
               <a:rPr lang="ru-RU" smtClean="0"/>
-              <a:t>12.11.2019</a:t>
+              <a:pPr/>
+              <a:t>13.11.2019</a:t>
             </a:fld>
             <a:endParaRPr lang="ru-RU"/>
           </a:p>
@@ -2237,6 +2252,7 @@
           <a:p>
             <a:fld id="{CF8BA92F-384F-4CC9-95B3-CAC823A31A13}" type="slidenum">
               <a:rPr lang="ru-RU" smtClean="0"/>
+              <a:pPr/>
               <a:t>‹#›</a:t>
             </a:fld>
             <a:endParaRPr lang="ru-RU"/>
@@ -2308,7 +2324,8 @@
           <a:p>
             <a:fld id="{21CFE62A-C266-4BC2-B5C3-C25626D8874C}" type="datetime1">
               <a:rPr lang="ru-RU" smtClean="0"/>
-              <a:t>12.11.2019</a:t>
+              <a:pPr/>
+              <a:t>13.11.2019</a:t>
             </a:fld>
             <a:endParaRPr lang="ru-RU"/>
           </a:p>
@@ -2350,6 +2367,7 @@
           <a:p>
             <a:fld id="{CF8BA92F-384F-4CC9-95B3-CAC823A31A13}" type="slidenum">
               <a:rPr lang="ru-RU" smtClean="0"/>
+              <a:pPr/>
               <a:t>‹#›</a:t>
             </a:fld>
             <a:endParaRPr lang="ru-RU"/>
@@ -2398,7 +2416,8 @@
           <a:p>
             <a:fld id="{4C8739B2-4332-4B3A-B293-870BC0DA1E91}" type="datetime1">
               <a:rPr lang="ru-RU" smtClean="0"/>
-              <a:t>12.11.2019</a:t>
+              <a:pPr/>
+              <a:t>13.11.2019</a:t>
             </a:fld>
             <a:endParaRPr lang="ru-RU"/>
           </a:p>
@@ -2440,6 +2459,7 @@
           <a:p>
             <a:fld id="{CF8BA92F-384F-4CC9-95B3-CAC823A31A13}" type="slidenum">
               <a:rPr lang="ru-RU" smtClean="0"/>
+              <a:pPr/>
               <a:t>‹#›</a:t>
             </a:fld>
             <a:endParaRPr lang="ru-RU"/>
@@ -2670,7 +2690,8 @@
           <a:p>
             <a:fld id="{658AD996-0705-4515-8E87-11DDA260570B}" type="datetime1">
               <a:rPr lang="ru-RU" smtClean="0"/>
-              <a:t>12.11.2019</a:t>
+              <a:pPr/>
+              <a:t>13.11.2019</a:t>
             </a:fld>
             <a:endParaRPr lang="ru-RU"/>
           </a:p>
@@ -2712,6 +2733,7 @@
           <a:p>
             <a:fld id="{CF8BA92F-384F-4CC9-95B3-CAC823A31A13}" type="slidenum">
               <a:rPr lang="ru-RU" smtClean="0"/>
+              <a:pPr/>
               <a:t>‹#›</a:t>
             </a:fld>
             <a:endParaRPr lang="ru-RU"/>
@@ -2918,7 +2940,8 @@
           <a:p>
             <a:fld id="{4586EB43-EF2F-4D6F-8CAB-0790E0CAE656}" type="datetime1">
               <a:rPr lang="ru-RU" smtClean="0"/>
-              <a:t>12.11.2019</a:t>
+              <a:pPr/>
+              <a:t>13.11.2019</a:t>
             </a:fld>
             <a:endParaRPr lang="ru-RU"/>
           </a:p>
@@ -2960,6 +2983,7 @@
           <a:p>
             <a:fld id="{CF8BA92F-384F-4CC9-95B3-CAC823A31A13}" type="slidenum">
               <a:rPr lang="ru-RU" smtClean="0"/>
+              <a:pPr/>
               <a:t>‹#›</a:t>
             </a:fld>
             <a:endParaRPr lang="ru-RU"/>
@@ -3126,7 +3150,8 @@
           <a:p>
             <a:fld id="{F0B1AFF6-565C-4119-BE90-8A13757FD619}" type="datetime1">
               <a:rPr lang="ru-RU" smtClean="0"/>
-              <a:t>12.11.2019</a:t>
+              <a:pPr/>
+              <a:t>13.11.2019</a:t>
             </a:fld>
             <a:endParaRPr lang="ru-RU"/>
           </a:p>
@@ -3204,6 +3229,7 @@
           <a:p>
             <a:fld id="{CF8BA92F-384F-4CC9-95B3-CAC823A31A13}" type="slidenum">
               <a:rPr lang="ru-RU" smtClean="0"/>
+              <a:pPr/>
               <a:t>‹#›</a:t>
             </a:fld>
             <a:endParaRPr lang="ru-RU"/>
@@ -3559,7 +3585,7 @@
           <a:p>
             <a:r>
               <a:rPr lang="en-US" dirty="0" smtClean="0"/>
-              <a:t>V.I. </a:t>
+              <a:t>V.V. </a:t>
             </a:r>
             <a:r>
               <a:rPr lang="en-US" dirty="0" err="1" smtClean="0"/>
@@ -4581,6 +4607,7 @@
           <a:p>
             <a:fld id="{CF8BA92F-384F-4CC9-95B3-CAC823A31A13}" type="slidenum">
               <a:rPr lang="ru-RU" smtClean="0"/>
+              <a:pPr/>
               <a:t>2</a:t>
             </a:fld>
             <a:endParaRPr lang="ru-RU" dirty="0"/>
@@ -4705,6 +4732,7 @@
           <a:p>
             <a:fld id="{CF8BA92F-384F-4CC9-95B3-CAC823A31A13}" type="slidenum">
               <a:rPr lang="ru-RU" smtClean="0"/>
+              <a:pPr/>
               <a:t>3</a:t>
             </a:fld>
             <a:endParaRPr lang="ru-RU"/>

</xml_diff>